<commit_message>
Fixes a few typos within the document
</commit_message>
<xml_diff>
--- a/04-creating_a_custom_resource.pptx
+++ b/04-creating_a_custom_resource.pptx
@@ -6,10 +6,10 @@
     <p:sldMasterId id="2147483847" r:id="rId6"/>
   </p:sldMasterIdLst>
   <p:notesMasterIdLst>
-    <p:notesMasterId r:id="rId73"/>
+    <p:notesMasterId r:id="rId72"/>
   </p:notesMasterIdLst>
   <p:handoutMasterIdLst>
-    <p:handoutMasterId r:id="rId74"/>
+    <p:handoutMasterId r:id="rId73"/>
   </p:handoutMasterIdLst>
   <p:sldIdLst>
     <p:sldId id="256" r:id="rId7"/>
@@ -73,11 +73,10 @@
     <p:sldId id="327" r:id="rId65"/>
     <p:sldId id="326" r:id="rId66"/>
     <p:sldId id="328" r:id="rId67"/>
-    <p:sldId id="336" r:id="rId68"/>
-    <p:sldId id="349" r:id="rId69"/>
-    <p:sldId id="264" r:id="rId70"/>
-    <p:sldId id="266" r:id="rId71"/>
-    <p:sldId id="265" r:id="rId72"/>
+    <p:sldId id="349" r:id="rId68"/>
+    <p:sldId id="264" r:id="rId69"/>
+    <p:sldId id="266" r:id="rId70"/>
+    <p:sldId id="265" r:id="rId71"/>
   </p:sldIdLst>
   <p:sldSz cx="16256000" cy="9144000"/>
   <p:notesSz cx="6858000" cy="9144000"/>
@@ -339,7 +338,7 @@
               <a:pPr>
                 <a:defRPr/>
               </a:pPr>
-              <a:t>2016-10-18</a:t>
+              <a:t>2016-10-23</a:t>
             </a:fld>
             <a:endParaRPr lang="en-US" dirty="0"/>
           </a:p>
@@ -522,7 +521,7 @@
               <a:pPr>
                 <a:defRPr/>
               </a:pPr>
-              <a:t>2016-10-18</a:t>
+              <a:t>2016-10-23</a:t>
             </a:fld>
             <a:endParaRPr lang="en-US" dirty="0"/>
           </a:p>
@@ -5154,11 +5153,7 @@
             </a:r>
             <a:r>
               <a:rPr lang="en-US" baseline="0" dirty="0" smtClean="0"/>
-              <a:t> same file as you define the resource actions. Generally these are defined at the top of the file to make them immediately visible. A property is defined by specifying a method named property with two required parameters and a third set of optional parameters. The name of the property is defined as a Ruby Symbol. The type is a Ruby class name. This type enforces what kind of values are supported by this property; typically it is </a:t>
-            </a:r>
-            <a:r>
-              <a:rPr lang="en-US" baseline="0" dirty="0" smtClean="0"/>
-              <a:t>a String for text and a </a:t>
+              <a:t> same file as you define the resource actions. Generally these are defined at the top of the file to make them immediately visible. A property is defined by specifying a method named property with two required parameters and a third set of optional parameters. The name of the property is defined as a Ruby Symbol. The type is a Ruby class name. This type enforces what kind of values are supported by this property; typically it is a String for text and a </a:t>
             </a:r>
             <a:r>
               <a:rPr lang="en-US" baseline="0" dirty="0" err="1" smtClean="0"/>
@@ -7955,15 +7950,7 @@
           <a:p>
             <a:r>
               <a:rPr lang="en-US" dirty="0" smtClean="0"/>
-              <a:t>The remove action </a:t>
-            </a:r>
-            <a:r>
-              <a:rPr lang="en-US" dirty="0" smtClean="0"/>
-              <a:t>asks </a:t>
-            </a:r>
-            <a:r>
-              <a:rPr lang="en-US" dirty="0" smtClean="0"/>
-              <a:t>that you remove the directory</a:t>
+              <a:t>The remove action asks that you remove the directory</a:t>
             </a:r>
             <a:r>
               <a:rPr lang="en-US" baseline="0" dirty="0" smtClean="0"/>
@@ -8274,7 +8261,6 @@
               <a:rPr lang="en-US" baseline="0" dirty="0" smtClean="0"/>
               <a:t>The resource now has two actions and we have removed the initial welcome site.</a:t>
             </a:r>
-            <a:endParaRPr lang="en-US" baseline="0" dirty="0" smtClean="0"/>
           </a:p>
         </p:txBody>
       </p:sp>
@@ -9722,6 +9708,23 @@
           <a:lstStyle/>
           <a:p>
             <a:r>
+              <a:rPr lang="en-US" dirty="0" smtClean="0"/>
+              <a:t>The initial</a:t>
+            </a:r>
+            <a:r>
+              <a:rPr lang="en-US" baseline="0" dirty="0" smtClean="0"/>
+              <a:t> file resource has now been removed and we are creating a new apache virtual host on port 80 for our users' site. We have also updated all the expectations to correctly verify the state of the run list. Finally we also updated the tests that were executed on the virtual </a:t>
+            </a:r>
+            <a:r>
+              <a:rPr lang="en-US" baseline="0" dirty="0" smtClean="0"/>
+              <a:t>machine</a:t>
+            </a:r>
+          </a:p>
+          <a:p>
+            <a:endParaRPr lang="en-US" baseline="0" dirty="0" smtClean="0"/>
+          </a:p>
+          <a:p>
+            <a:r>
               <a:rPr lang="en-US" baseline="0" dirty="0" smtClean="0"/>
               <a:t>Congratulations! </a:t>
             </a:r>
@@ -9731,18 +9734,16 @@
             </a:r>
             <a:r>
               <a:rPr lang="en-US" baseline="0" dirty="0" smtClean="0"/>
-              <a:t> custom resource now is able to create sites and remove them.</a:t>
-            </a:r>
-          </a:p>
-          <a:p>
+              <a:t> custom resource now is able to create sites and remove them. There are still more things to learn about custom resources that we will explore in the next module.</a:t>
+            </a:r>
+            <a:endParaRPr lang="en-US" dirty="0" smtClean="0"/>
+          </a:p>
+          <a:p>
+            <a:r>
+              <a:rPr lang="en-US" baseline="0" dirty="0" smtClean="0"/>
+              <a:t>.</a:t>
+            </a:r>
             <a:endParaRPr lang="en-US" baseline="0" dirty="0" smtClean="0"/>
-          </a:p>
-          <a:p>
-            <a:r>
-              <a:rPr lang="en-US" baseline="0" dirty="0" smtClean="0"/>
-              <a:t>There are still more things to learn about custom resources that we will explore in the next module.</a:t>
-            </a:r>
-            <a:endParaRPr lang="en-US" dirty="0"/>
           </a:p>
         </p:txBody>
       </p:sp>
@@ -9822,7 +9823,7 @@
     </p:spTree>
     <p:extLst>
       <p:ext uri="{BB962C8B-B14F-4D97-AF65-F5344CB8AC3E}">
-        <p14:creationId xmlns:p14="http://schemas.microsoft.com/office/powerpoint/2010/main" val="336022930"/>
+        <p14:creationId xmlns:p14="http://schemas.microsoft.com/office/powerpoint/2010/main" val="855420164"/>
       </p:ext>
     </p:extLst>
   </p:cSld>
@@ -9876,15 +9877,110 @@
           <a:bodyPr/>
           <a:lstStyle/>
           <a:p>
+            <a:pPr marL="0" marR="0" indent="0" algn="l" defTabSz="1217613" rtl="0" eaLnBrk="1" fontAlgn="base" latinLnBrk="0" hangingPunct="1">
+              <a:lnSpc>
+                <a:spcPct val="90000"/>
+              </a:lnSpc>
+              <a:spcBef>
+                <a:spcPct val="30000"/>
+              </a:spcBef>
+              <a:spcAft>
+                <a:spcPts val="450"/>
+              </a:spcAft>
+              <a:buClrTx/>
+              <a:buSzTx/>
+              <a:buFontTx/>
+              <a:buNone/>
+              <a:tabLst/>
+              <a:defRPr/>
+            </a:pPr>
             <a:r>
               <a:rPr lang="en-US" dirty="0" smtClean="0"/>
-              <a:t>The initial</a:t>
+              <a:t>Let's finish this module with a discussion.</a:t>
             </a:r>
             <a:r>
               <a:rPr lang="en-US" baseline="0" dirty="0" smtClean="0"/>
-              <a:t> file resource has now been removed and we are creating a new apache virtual host on port 80 for our users' site. We have also updated all the expectations to correctly verify the state of the run list. Finally we also updated the tests that were executed on the virtual machine.</a:t>
-            </a:r>
-            <a:endParaRPr lang="en-US" baseline="0" dirty="0" smtClean="0"/>
+              <a:t> </a:t>
+            </a:r>
+            <a:r>
+              <a:rPr lang="en-US" dirty="0" smtClean="0"/>
+              <a:t>Answer these questions.</a:t>
+            </a:r>
+            <a:r>
+              <a:rPr lang="en-US" baseline="0" dirty="0" smtClean="0"/>
+              <a:t> </a:t>
+            </a:r>
+            <a:r>
+              <a:rPr lang="en-US" dirty="0" smtClean="0"/>
+              <a:t>Remember that the answer "I don't know! That's why I'm here!" is a great answer.</a:t>
+            </a:r>
+          </a:p>
+          <a:p>
+            <a:pPr marL="0" marR="0" indent="0" algn="l" defTabSz="1217613" rtl="0" eaLnBrk="1" fontAlgn="base" latinLnBrk="0" hangingPunct="1">
+              <a:lnSpc>
+                <a:spcPct val="90000"/>
+              </a:lnSpc>
+              <a:spcBef>
+                <a:spcPct val="30000"/>
+              </a:spcBef>
+              <a:spcAft>
+                <a:spcPts val="450"/>
+              </a:spcAft>
+              <a:buClrTx/>
+              <a:buSzTx/>
+              <a:buFontTx/>
+              <a:buNone/>
+              <a:tabLst/>
+              <a:defRPr/>
+            </a:pPr>
+            <a:endParaRPr lang="en-US" dirty="0" smtClean="0"/>
+          </a:p>
+          <a:p>
+            <a:pPr marL="0" marR="0" indent="0" algn="l" defTabSz="1219090" rtl="0" eaLnBrk="1" fontAlgn="auto" latinLnBrk="0" hangingPunct="1">
+              <a:lnSpc>
+                <a:spcPct val="90000"/>
+              </a:lnSpc>
+              <a:spcBef>
+                <a:spcPts val="0"/>
+              </a:spcBef>
+              <a:spcAft>
+                <a:spcPts val="444"/>
+              </a:spcAft>
+              <a:buClrTx/>
+              <a:buSzTx/>
+              <a:buFontTx/>
+              <a:buNone/>
+              <a:tabLst/>
+              <a:defRPr/>
+            </a:pPr>
+            <a:r>
+              <a:rPr lang="en-US" baseline="0" dirty="0" smtClean="0"/>
+              <a:t>Instructor Note: With large groups I often find it better to have individuals turn to the individuals around them, form groups of whatever size they feel comfortable, and have them take turns asking and answering the questions. When all the groups are done I then open the discussion up to the entire group allowing each group or individuals to share their answers.</a:t>
+            </a:r>
+            <a:endParaRPr lang="en-US" dirty="0" smtClean="0"/>
+          </a:p>
+          <a:p>
+            <a:endParaRPr lang="en-US" dirty="0" smtClean="0"/>
+          </a:p>
+          <a:p>
+            <a:pPr marL="0" marR="0" indent="0" algn="l" defTabSz="1217613" rtl="0" eaLnBrk="1" fontAlgn="base" latinLnBrk="0" hangingPunct="1">
+              <a:lnSpc>
+                <a:spcPct val="90000"/>
+              </a:lnSpc>
+              <a:spcBef>
+                <a:spcPct val="30000"/>
+              </a:spcBef>
+              <a:spcAft>
+                <a:spcPts val="450"/>
+              </a:spcAft>
+              <a:buClrTx/>
+              <a:buSzTx/>
+              <a:buFontTx/>
+              <a:buNone/>
+              <a:tabLst/>
+              <a:defRPr/>
+            </a:pPr>
+            <a:endParaRPr lang="en-US" dirty="0" smtClean="0"/>
           </a:p>
         </p:txBody>
       </p:sp>
@@ -9964,7 +10060,7 @@
     </p:spTree>
     <p:extLst>
       <p:ext uri="{BB962C8B-B14F-4D97-AF65-F5344CB8AC3E}">
-        <p14:creationId xmlns:p14="http://schemas.microsoft.com/office/powerpoint/2010/main" val="855420164"/>
+        <p14:creationId xmlns:p14="http://schemas.microsoft.com/office/powerpoint/2010/main" val="1601642993"/>
       </p:ext>
     </p:extLst>
   </p:cSld>
@@ -10018,109 +10114,10 @@
           <a:bodyPr/>
           <a:lstStyle/>
           <a:p>
-            <a:pPr marL="0" marR="0" indent="0" algn="l" defTabSz="1217613" rtl="0" eaLnBrk="1" fontAlgn="base" latinLnBrk="0" hangingPunct="1">
-              <a:lnSpc>
-                <a:spcPct val="90000"/>
-              </a:lnSpc>
-              <a:spcBef>
-                <a:spcPct val="30000"/>
-              </a:spcBef>
-              <a:spcAft>
-                <a:spcPts val="450"/>
-              </a:spcAft>
-              <a:buClrTx/>
-              <a:buSzTx/>
-              <a:buFontTx/>
-              <a:buNone/>
-              <a:tabLst/>
-              <a:defRPr/>
-            </a:pPr>
-            <a:r>
-              <a:rPr lang="en-US" dirty="0" smtClean="0"/>
-              <a:t>Let's finish this module with a discussion.</a:t>
-            </a:r>
-            <a:r>
-              <a:rPr lang="en-US" baseline="0" dirty="0" smtClean="0"/>
-              <a:t> </a:t>
-            </a:r>
-            <a:r>
-              <a:rPr lang="en-US" dirty="0" smtClean="0"/>
-              <a:t>Answer these questions.</a:t>
-            </a:r>
-            <a:r>
-              <a:rPr lang="en-US" baseline="0" dirty="0" smtClean="0"/>
-              <a:t> </a:t>
-            </a:r>
-            <a:r>
-              <a:rPr lang="en-US" dirty="0" smtClean="0"/>
-              <a:t>Remember that the answer "I don't know! That's why I'm here!" is a great answer.</a:t>
-            </a:r>
-          </a:p>
-          <a:p>
-            <a:pPr marL="0" marR="0" indent="0" algn="l" defTabSz="1217613" rtl="0" eaLnBrk="1" fontAlgn="base" latinLnBrk="0" hangingPunct="1">
-              <a:lnSpc>
-                <a:spcPct val="90000"/>
-              </a:lnSpc>
-              <a:spcBef>
-                <a:spcPct val="30000"/>
-              </a:spcBef>
-              <a:spcAft>
-                <a:spcPts val="450"/>
-              </a:spcAft>
-              <a:buClrTx/>
-              <a:buSzTx/>
-              <a:buFontTx/>
-              <a:buNone/>
-              <a:tabLst/>
-              <a:defRPr/>
-            </a:pPr>
-            <a:endParaRPr lang="en-US" dirty="0" smtClean="0"/>
-          </a:p>
-          <a:p>
-            <a:pPr marL="0" marR="0" indent="0" algn="l" defTabSz="1219090" rtl="0" eaLnBrk="1" fontAlgn="auto" latinLnBrk="0" hangingPunct="1">
-              <a:lnSpc>
-                <a:spcPct val="90000"/>
-              </a:lnSpc>
-              <a:spcBef>
-                <a:spcPts val="0"/>
-              </a:spcBef>
-              <a:spcAft>
-                <a:spcPts val="444"/>
-              </a:spcAft>
-              <a:buClrTx/>
-              <a:buSzTx/>
-              <a:buFontTx/>
-              <a:buNone/>
-              <a:tabLst/>
-              <a:defRPr/>
-            </a:pPr>
-            <a:r>
-              <a:rPr lang="en-US" baseline="0" dirty="0" smtClean="0"/>
-              <a:t>Instructor Note: With large groups I often find it better to have individuals turn to the individuals around them, form groups of whatever size they feel comfortable, and have them take turns asking and answering the questions. When all the groups are done I then open the discussion up to the entire group allowing each group or individuals to share their answers.</a:t>
-            </a:r>
-            <a:endParaRPr lang="en-US" dirty="0" smtClean="0"/>
-          </a:p>
-          <a:p>
-            <a:endParaRPr lang="en-US" dirty="0" smtClean="0"/>
-          </a:p>
-          <a:p>
-            <a:pPr marL="0" marR="0" indent="0" algn="l" defTabSz="1217613" rtl="0" eaLnBrk="1" fontAlgn="base" latinLnBrk="0" hangingPunct="1">
-              <a:lnSpc>
-                <a:spcPct val="90000"/>
-              </a:lnSpc>
-              <a:spcBef>
-                <a:spcPct val="30000"/>
-              </a:spcBef>
-              <a:spcAft>
-                <a:spcPts val="450"/>
-              </a:spcAft>
-              <a:buClrTx/>
-              <a:buSzTx/>
-              <a:buFontTx/>
-              <a:buNone/>
-              <a:tabLst/>
-              <a:defRPr/>
-            </a:pPr>
+            <a:r>
+              <a:rPr lang="en-US" smtClean="0"/>
+              <a:t>What questions can we answer for you?</a:t>
+            </a:r>
             <a:endParaRPr lang="en-US" dirty="0" smtClean="0"/>
           </a:p>
         </p:txBody>
@@ -10149,144 +10146,6 @@
                 <a:defRPr/>
               </a:pPr>
               <a:t>64</a:t>
-            </a:fld>
-            <a:endParaRPr lang="en-US" dirty="0"/>
-          </a:p>
-        </p:txBody>
-      </p:sp>
-      <p:sp>
-        <p:nvSpPr>
-          <p:cNvPr id="5" name="Header Placeholder 4"/>
-          <p:cNvSpPr>
-            <a:spLocks noGrp="1"/>
-          </p:cNvSpPr>
-          <p:nvPr>
-            <p:ph type="hdr" sz="quarter" idx="11"/>
-          </p:nvPr>
-        </p:nvSpPr>
-        <p:spPr/>
-        <p:txBody>
-          <a:bodyPr/>
-          <a:lstStyle/>
-          <a:p>
-            <a:pPr>
-              <a:defRPr/>
-            </a:pPr>
-            <a:endParaRPr lang="en-US"/>
-          </a:p>
-        </p:txBody>
-      </p:sp>
-      <p:sp>
-        <p:nvSpPr>
-          <p:cNvPr id="6" name="Footer Placeholder 5"/>
-          <p:cNvSpPr>
-            <a:spLocks noGrp="1"/>
-          </p:cNvSpPr>
-          <p:nvPr>
-            <p:ph type="ftr" sz="quarter" idx="12"/>
-          </p:nvPr>
-        </p:nvSpPr>
-        <p:spPr/>
-        <p:txBody>
-          <a:bodyPr/>
-          <a:lstStyle/>
-          <a:p>
-            <a:pPr>
-              <a:defRPr/>
-            </a:pPr>
-            <a:endParaRPr lang="en-US"/>
-          </a:p>
-        </p:txBody>
-      </p:sp>
-    </p:spTree>
-    <p:extLst>
-      <p:ext uri="{BB962C8B-B14F-4D97-AF65-F5344CB8AC3E}">
-        <p14:creationId xmlns:p14="http://schemas.microsoft.com/office/powerpoint/2010/main" val="1601642993"/>
-      </p:ext>
-    </p:extLst>
-  </p:cSld>
-  <p:clrMapOvr>
-    <a:masterClrMapping/>
-  </p:clrMapOvr>
-</p:notes>
-</file>
-
-<file path=ppt/notesSlides/notesSlide65.xml><?xml version="1.0" encoding="utf-8"?>
-<p:notes xmlns:a="http://schemas.openxmlformats.org/drawingml/2006/main" xmlns:r="http://schemas.openxmlformats.org/officeDocument/2006/relationships" xmlns:p="http://schemas.openxmlformats.org/presentationml/2006/main">
-  <p:cSld>
-    <p:spTree>
-      <p:nvGrpSpPr>
-        <p:cNvPr id="1" name=""/>
-        <p:cNvGrpSpPr/>
-        <p:nvPr/>
-      </p:nvGrpSpPr>
-      <p:grpSpPr>
-        <a:xfrm>
-          <a:off x="0" y="0"/>
-          <a:ext cx="0" cy="0"/>
-          <a:chOff x="0" y="0"/>
-          <a:chExt cx="0" cy="0"/>
-        </a:xfrm>
-      </p:grpSpPr>
-      <p:sp>
-        <p:nvSpPr>
-          <p:cNvPr id="2" name="Slide Image Placeholder 1"/>
-          <p:cNvSpPr>
-            <a:spLocks noGrp="1" noRot="1" noChangeAspect="1"/>
-          </p:cNvSpPr>
-          <p:nvPr>
-            <p:ph type="sldImg"/>
-          </p:nvPr>
-        </p:nvSpPr>
-        <p:spPr/>
-      </p:sp>
-      <p:sp>
-        <p:nvSpPr>
-          <p:cNvPr id="3" name="Notes Placeholder 2"/>
-          <p:cNvSpPr>
-            <a:spLocks noGrp="1"/>
-          </p:cNvSpPr>
-          <p:nvPr>
-            <p:ph type="body" idx="1"/>
-          </p:nvPr>
-        </p:nvSpPr>
-        <p:spPr/>
-        <p:txBody>
-          <a:bodyPr/>
-          <a:lstStyle/>
-          <a:p>
-            <a:r>
-              <a:rPr lang="en-US" smtClean="0"/>
-              <a:t>What questions can we answer for you?</a:t>
-            </a:r>
-            <a:endParaRPr lang="en-US" dirty="0" smtClean="0"/>
-          </a:p>
-        </p:txBody>
-      </p:sp>
-      <p:sp>
-        <p:nvSpPr>
-          <p:cNvPr id="4" name="Slide Number Placeholder 3"/>
-          <p:cNvSpPr>
-            <a:spLocks noGrp="1"/>
-          </p:cNvSpPr>
-          <p:nvPr>
-            <p:ph type="sldNum" sz="quarter" idx="10"/>
-          </p:nvPr>
-        </p:nvSpPr>
-        <p:spPr/>
-        <p:txBody>
-          <a:bodyPr/>
-          <a:lstStyle/>
-          <a:p>
-            <a:pPr>
-              <a:defRPr/>
-            </a:pPr>
-            <a:fld id="{DC3734AA-3150-D947-AC52-2F5DF48BFCD5}" type="slidenum">
-              <a:rPr lang="en-US" smtClean="0"/>
-              <a:pPr>
-                <a:defRPr/>
-              </a:pPr>
-              <a:t>65</a:t>
             </a:fld>
             <a:endParaRPr lang="en-US" dirty="0"/>
           </a:p>
@@ -11340,14 +11199,14 @@
           </a:ln>
           <a:extLst>
             <a:ext uri="{909E8E84-426E-40dd-AFC4-6F175D3DCCD1}">
-              <a14:hiddenFill xmlns="" xmlns:a14="http://schemas.microsoft.com/office/drawing/2010/main">
+              <a14:hiddenFill xmlns:a14="http://schemas.microsoft.com/office/drawing/2010/main" xmlns="">
                 <a:solidFill>
                   <a:srgbClr val="FFFFFF"/>
                 </a:solidFill>
               </a14:hiddenFill>
             </a:ext>
             <a:ext uri="{91240B29-F687-4f45-9708-019B960494DF}">
-              <a14:hiddenLine xmlns="" xmlns:a14="http://schemas.microsoft.com/office/drawing/2010/main" w="9525">
+              <a14:hiddenLine xmlns:a14="http://schemas.microsoft.com/office/drawing/2010/main" xmlns="" w="9525">
                 <a:solidFill>
                   <a:srgbClr val="000000"/>
                 </a:solidFill>
@@ -11495,14 +11354,14 @@
           </a:ln>
           <a:extLst>
             <a:ext uri="{909E8E84-426E-40dd-AFC4-6F175D3DCCD1}">
-              <a14:hiddenFill xmlns="" xmlns:a14="http://schemas.microsoft.com/office/drawing/2010/main">
+              <a14:hiddenFill xmlns:a14="http://schemas.microsoft.com/office/drawing/2010/main" xmlns="">
                 <a:solidFill>
                   <a:srgbClr val="FFFFFF"/>
                 </a:solidFill>
               </a14:hiddenFill>
             </a:ext>
             <a:ext uri="{91240B29-F687-4f45-9708-019B960494DF}">
-              <a14:hiddenLine xmlns="" xmlns:a14="http://schemas.microsoft.com/office/drawing/2010/main" w="9525">
+              <a14:hiddenLine xmlns:a14="http://schemas.microsoft.com/office/drawing/2010/main" xmlns="" w="9525">
                 <a:solidFill>
                   <a:srgbClr val="000000"/>
                 </a:solidFill>
@@ -11958,14 +11817,14 @@
           </a:ln>
           <a:extLst>
             <a:ext uri="{909E8E84-426E-40dd-AFC4-6F175D3DCCD1}">
-              <a14:hiddenFill xmlns="" xmlns:a14="http://schemas.microsoft.com/office/drawing/2010/main">
+              <a14:hiddenFill xmlns:a14="http://schemas.microsoft.com/office/drawing/2010/main" xmlns="">
                 <a:solidFill>
                   <a:srgbClr val="FFFFFF"/>
                 </a:solidFill>
               </a14:hiddenFill>
             </a:ext>
             <a:ext uri="{91240B29-F687-4f45-9708-019B960494DF}">
-              <a14:hiddenLine xmlns="" xmlns:a14="http://schemas.microsoft.com/office/drawing/2010/main" w="9525">
+              <a14:hiddenLine xmlns:a14="http://schemas.microsoft.com/office/drawing/2010/main" xmlns="" w="9525">
                 <a:solidFill>
                   <a:srgbClr val="000000"/>
                 </a:solidFill>
@@ -13414,14 +13273,14 @@
           </a:ln>
           <a:extLst>
             <a:ext uri="{909E8E84-426E-40dd-AFC4-6F175D3DCCD1}">
-              <a14:hiddenFill xmlns="" xmlns:a14="http://schemas.microsoft.com/office/drawing/2010/main">
+              <a14:hiddenFill xmlns:a14="http://schemas.microsoft.com/office/drawing/2010/main" xmlns="">
                 <a:solidFill>
                   <a:srgbClr val="FFFFFF"/>
                 </a:solidFill>
               </a14:hiddenFill>
             </a:ext>
             <a:ext uri="{91240B29-F687-4f45-9708-019B960494DF}">
-              <a14:hiddenLine xmlns="" xmlns:a14="http://schemas.microsoft.com/office/drawing/2010/main" w="9525">
+              <a14:hiddenLine xmlns:a14="http://schemas.microsoft.com/office/drawing/2010/main" xmlns="" w="9525">
                 <a:solidFill>
                   <a:srgbClr val="000000"/>
                 </a:solidFill>
@@ -14775,14 +14634,14 @@
           </a:ln>
           <a:extLst>
             <a:ext uri="{909E8E84-426E-40dd-AFC4-6F175D3DCCD1}">
-              <a14:hiddenFill xmlns="" xmlns:a14="http://schemas.microsoft.com/office/drawing/2010/main">
+              <a14:hiddenFill xmlns:a14="http://schemas.microsoft.com/office/drawing/2010/main" xmlns="">
                 <a:solidFill>
                   <a:srgbClr val="FFFFFF"/>
                 </a:solidFill>
               </a14:hiddenFill>
             </a:ext>
             <a:ext uri="{91240B29-F687-4f45-9708-019B960494DF}">
-              <a14:hiddenLine xmlns="" xmlns:a14="http://schemas.microsoft.com/office/drawing/2010/main" w="9525">
+              <a14:hiddenLine xmlns:a14="http://schemas.microsoft.com/office/drawing/2010/main" xmlns="" w="9525">
                 <a:solidFill>
                   <a:srgbClr val="000000"/>
                 </a:solidFill>
@@ -15305,14 +15164,14 @@
           </a:ln>
           <a:extLst>
             <a:ext uri="{909E8E84-426E-40dd-AFC4-6F175D3DCCD1}">
-              <a14:hiddenFill xmlns="" xmlns:a14="http://schemas.microsoft.com/office/drawing/2010/main">
+              <a14:hiddenFill xmlns:a14="http://schemas.microsoft.com/office/drawing/2010/main" xmlns="">
                 <a:solidFill>
                   <a:srgbClr val="FFFFFF"/>
                 </a:solidFill>
               </a14:hiddenFill>
             </a:ext>
             <a:ext uri="{91240B29-F687-4f45-9708-019B960494DF}">
-              <a14:hiddenLine xmlns="" xmlns:a14="http://schemas.microsoft.com/office/drawing/2010/main" w="9525">
+              <a14:hiddenLine xmlns:a14="http://schemas.microsoft.com/office/drawing/2010/main" xmlns="" w="9525">
                 <a:solidFill>
                   <a:srgbClr val="000000"/>
                 </a:solidFill>
@@ -15844,14 +15703,14 @@
           </a:ln>
           <a:extLst>
             <a:ext uri="{909E8E84-426E-40dd-AFC4-6F175D3DCCD1}">
-              <a14:hiddenFill xmlns="" xmlns:a14="http://schemas.microsoft.com/office/drawing/2010/main">
+              <a14:hiddenFill xmlns:a14="http://schemas.microsoft.com/office/drawing/2010/main" xmlns="">
                 <a:solidFill>
                   <a:srgbClr val="FFFFFF"/>
                 </a:solidFill>
               </a14:hiddenFill>
             </a:ext>
             <a:ext uri="{91240B29-F687-4f45-9708-019B960494DF}">
-              <a14:hiddenLine xmlns="" xmlns:a14="http://schemas.microsoft.com/office/drawing/2010/main" w="9525">
+              <a14:hiddenLine xmlns:a14="http://schemas.microsoft.com/office/drawing/2010/main" xmlns="" w="9525">
                 <a:solidFill>
                   <a:srgbClr val="000000"/>
                 </a:solidFill>
@@ -16791,14 +16650,14 @@
           </a:ln>
           <a:extLst>
             <a:ext uri="{909E8E84-426E-40dd-AFC4-6F175D3DCCD1}">
-              <a14:hiddenFill xmlns="" xmlns:a14="http://schemas.microsoft.com/office/drawing/2010/main">
+              <a14:hiddenFill xmlns:a14="http://schemas.microsoft.com/office/drawing/2010/main" xmlns="">
                 <a:solidFill>
                   <a:srgbClr val="FFFFFF"/>
                 </a:solidFill>
               </a14:hiddenFill>
             </a:ext>
             <a:ext uri="{91240B29-F687-4f45-9708-019B960494DF}">
-              <a14:hiddenLine xmlns="" xmlns:a14="http://schemas.microsoft.com/office/drawing/2010/main" w="9525">
+              <a14:hiddenLine xmlns:a14="http://schemas.microsoft.com/office/drawing/2010/main" xmlns="" w="9525">
                 <a:solidFill>
                   <a:srgbClr val="000000"/>
                 </a:solidFill>
@@ -17571,14 +17430,14 @@
           </a:ln>
           <a:extLst>
             <a:ext uri="{909E8E84-426E-40dd-AFC4-6F175D3DCCD1}">
-              <a14:hiddenFill xmlns="" xmlns:a14="http://schemas.microsoft.com/office/drawing/2010/main">
+              <a14:hiddenFill xmlns:a14="http://schemas.microsoft.com/office/drawing/2010/main" xmlns="">
                 <a:solidFill>
                   <a:srgbClr val="FFFFFF"/>
                 </a:solidFill>
               </a14:hiddenFill>
             </a:ext>
             <a:ext uri="{91240B29-F687-4f45-9708-019B960494DF}">
-              <a14:hiddenLine xmlns="" xmlns:a14="http://schemas.microsoft.com/office/drawing/2010/main" w="9525">
+              <a14:hiddenLine xmlns:a14="http://schemas.microsoft.com/office/drawing/2010/main" xmlns="" w="9525">
                 <a:solidFill>
                   <a:srgbClr val="000000"/>
                 </a:solidFill>
@@ -18612,15 +18471,7 @@
             </a:r>
             <a:r>
               <a:rPr lang="en-US" sz="2000" dirty="0" smtClean="0"/>
-              <a:t>  </a:t>
-            </a:r>
-            <a:r>
-              <a:rPr lang="en-US" sz="2000" dirty="0" smtClean="0"/>
-              <a:t> </a:t>
-            </a:r>
-            <a:r>
-              <a:rPr lang="en-US" sz="2000" dirty="0" smtClean="0"/>
-              <a:t>end</a:t>
+              <a:t>   end</a:t>
             </a:r>
             <a:endParaRPr lang="en-US" sz="2000" dirty="0"/>
           </a:p>
@@ -29725,21 +29576,8 @@
                   <a:schemeClr val="bg1"/>
                 </a:solidFill>
               </a:rPr>
-              <a:t>t</a:t>
-            </a:r>
-            <a:r>
-              <a:rPr lang="en-US" sz="2800" dirty="0" smtClean="0">
-                <a:solidFill>
-                  <a:schemeClr val="bg1"/>
-                </a:solidFill>
-              </a:rPr>
-              <a:t>ype</a:t>
-            </a:r>
-            <a:endParaRPr lang="en-US" sz="2800" dirty="0" smtClean="0">
-              <a:solidFill>
-                <a:schemeClr val="bg1"/>
-              </a:solidFill>
-            </a:endParaRPr>
+              <a:t>type</a:t>
+            </a:r>
           </a:p>
         </p:txBody>
       </p:sp>
@@ -30074,19 +29912,6 @@
               </a:rPr>
               <a:t>1</a:t>
             </a:r>
-            <a:endParaRPr lang="en-US" sz="2400" b="1" dirty="0" smtClean="0">
-              <a:gradFill>
-                <a:gsLst>
-                  <a:gs pos="0">
-                    <a:srgbClr val="FFFFFF"/>
-                  </a:gs>
-                  <a:gs pos="100000">
-                    <a:srgbClr val="FFFFFF"/>
-                  </a:gs>
-                </a:gsLst>
-                <a:lin ang="5400000" scaled="0"/>
-              </a:gradFill>
-            </a:endParaRPr>
           </a:p>
         </p:txBody>
       </p:sp>
@@ -30232,19 +30057,6 @@
               </a:rPr>
               <a:t>1</a:t>
             </a:r>
-            <a:endParaRPr lang="en-US" sz="2400" b="1" dirty="0" smtClean="0">
-              <a:gradFill>
-                <a:gsLst>
-                  <a:gs pos="0">
-                    <a:srgbClr val="FFFFFF"/>
-                  </a:gs>
-                  <a:gs pos="100000">
-                    <a:srgbClr val="FFFFFF"/>
-                  </a:gs>
-                </a:gsLst>
-                <a:lin ang="5400000" scaled="0"/>
-              </a:gradFill>
-            </a:endParaRPr>
           </a:p>
         </p:txBody>
       </p:sp>
@@ -30563,11 +30375,6 @@
               </a:rPr>
               <a:t>end</a:t>
             </a:r>
-            <a:endParaRPr lang="en-US" b="1" dirty="0">
-              <a:latin typeface="Courier New" charset="0"/>
-              <a:ea typeface="Courier New" charset="0"/>
-              <a:cs typeface="Courier New" charset="0"/>
-            </a:endParaRPr>
           </a:p>
         </p:txBody>
       </p:sp>
@@ -31489,11 +31296,7 @@
             </a:r>
             <a:r>
               <a:rPr lang="en-US" sz="2000" dirty="0" smtClean="0"/>
-              <a:t>, port: 8080</a:t>
-            </a:r>
-            <a:r>
-              <a:rPr lang="en-US" sz="2000" dirty="0" smtClean="0"/>
-              <a:t>)</a:t>
+              <a:t>, port: 8080)</a:t>
             </a:r>
           </a:p>
           <a:p>
@@ -35002,15 +34805,7 @@
             </a:pPr>
             <a:r>
               <a:rPr lang="en-US" dirty="0" smtClean="0"/>
-              <a:t>Define the 'remove' </a:t>
-            </a:r>
-            <a:r>
-              <a:rPr lang="en-US" dirty="0" smtClean="0"/>
-              <a:t>action </a:t>
-            </a:r>
-            <a:r>
-              <a:rPr lang="en-US" dirty="0" smtClean="0"/>
-              <a:t>for </a:t>
+              <a:t>Define the 'remove' action for </a:t>
             </a:r>
             <a:r>
               <a:rPr lang="en-US" dirty="0" err="1" smtClean="0"/>
@@ -35018,11 +34813,7 @@
             </a:r>
             <a:r>
               <a:rPr lang="en-US" dirty="0" smtClean="0"/>
-              <a:t> that </a:t>
-            </a:r>
-            <a:r>
-              <a:rPr lang="en-US" dirty="0" smtClean="0"/>
-              <a:t>defines the policy:</a:t>
+              <a:t> that defines the policy:</a:t>
             </a:r>
           </a:p>
           <a:p>
@@ -35215,11 +35006,7 @@
             </a:pPr>
             <a:r>
               <a:rPr lang="en-US" dirty="0" smtClean="0"/>
-              <a:t>Update </a:t>
-            </a:r>
-            <a:r>
-              <a:rPr lang="en-US" dirty="0" smtClean="0"/>
-              <a:t>the default recipe's policy to include a new resource:</a:t>
+              <a:t>Update the default recipe's policy to include a new resource:</a:t>
             </a:r>
           </a:p>
           <a:p>
@@ -36529,11 +36316,7 @@
             </a:r>
             <a:r>
               <a:rPr lang="en-US" dirty="0" smtClean="0"/>
-              <a:t> resource named '</a:t>
-            </a:r>
-            <a:r>
-              <a:rPr lang="en-US" smtClean="0"/>
-              <a:t>users'</a:t>
+              <a:t> resource named 'users'</a:t>
             </a:r>
             <a:endParaRPr lang="en-US" dirty="0"/>
           </a:p>
@@ -38735,7 +38518,15 @@
           <a:p>
             <a:r>
               <a:rPr lang="en-US" dirty="0" err="1" smtClean="0"/>
-              <a:t>httpd_vhost</a:t>
+              <a:t>httpd_</a:t>
+            </a:r>
+            <a:r>
+              <a:rPr lang="en-US" dirty="0" err="1"/>
+              <a:t>v</a:t>
+            </a:r>
+            <a:r>
+              <a:rPr lang="en-US" dirty="0" err="1" smtClean="0"/>
+              <a:t>host</a:t>
             </a:r>
             <a:r>
               <a:rPr lang="en-US" dirty="0" smtClean="0"/>
@@ -38758,7 +38549,7 @@
         <p:spPr>
           <a:xfrm>
             <a:off x="1671638" y="3260725"/>
-            <a:ext cx="12319000" cy="4573090"/>
+            <a:ext cx="12319000" cy="4738164"/>
           </a:xfrm>
         </p:spPr>
         <p:txBody>
@@ -38774,47 +38565,133 @@
             </a:pPr>
             <a:r>
               <a:rPr lang="en-US" dirty="0" smtClean="0"/>
-              <a:t>Add a new 'remove' action to the </a:t>
-            </a:r>
-            <a:r>
-              <a:rPr lang="en-US" dirty="0" err="1" smtClean="0"/>
-              <a:t>httpd_vhost</a:t>
+              <a:t>Update </a:t>
+            </a:r>
+            <a:r>
+              <a:rPr lang="en-US" dirty="0"/>
+              <a:t>the default recipe's </a:t>
             </a:r>
             <a:r>
               <a:rPr lang="en-US" dirty="0" smtClean="0"/>
-              <a:t> resource that:</a:t>
-            </a:r>
-          </a:p>
-          <a:p>
-            <a:pPr lvl="1" algn="l">
+              <a:t>policy:</a:t>
+            </a:r>
+            <a:endParaRPr lang="en-US" dirty="0"/>
+          </a:p>
+          <a:p>
+            <a:pPr lvl="2" algn="l">
               <a:lnSpc>
                 <a:spcPct val="150000"/>
               </a:lnSpc>
             </a:pPr>
             <a:r>
-              <a:rPr lang="en-US" sz="2400" i="1" dirty="0" smtClean="0">
+              <a:rPr lang="en-US" dirty="0" smtClean="0">
                 <a:solidFill>
-                  <a:schemeClr val="tx1"/>
+                  <a:srgbClr val="3E4346"/>
                 </a:solidFill>
               </a:rPr>
-              <a:t>Removes the directory that is created</a:t>
-            </a:r>
-          </a:p>
-          <a:p>
-            <a:pPr lvl="1" algn="l">
+              <a:t>Remove the file resource named </a:t>
+            </a:r>
+            <a:r>
+              <a:rPr lang="en-US" dirty="0">
+                <a:solidFill>
+                  <a:srgbClr val="3E4346"/>
+                </a:solidFill>
+              </a:rPr>
+              <a:t>'/</a:t>
+            </a:r>
+            <a:r>
+              <a:rPr lang="en-US" dirty="0" err="1">
+                <a:solidFill>
+                  <a:srgbClr val="3E4346"/>
+                </a:solidFill>
+              </a:rPr>
+              <a:t>var</a:t>
+            </a:r>
+            <a:r>
+              <a:rPr lang="en-US" dirty="0">
+                <a:solidFill>
+                  <a:srgbClr val="3E4346"/>
+                </a:solidFill>
+              </a:rPr>
+              <a:t>/www/html/</a:t>
+            </a:r>
+            <a:r>
+              <a:rPr lang="en-US" dirty="0" err="1">
+                <a:solidFill>
+                  <a:srgbClr val="3E4346"/>
+                </a:solidFill>
+              </a:rPr>
+              <a:t>index.html</a:t>
+            </a:r>
+            <a:r>
+              <a:rPr lang="en-US" dirty="0">
+                <a:solidFill>
+                  <a:srgbClr val="3E4346"/>
+                </a:solidFill>
+              </a:rPr>
+              <a:t>'</a:t>
+            </a:r>
+            <a:endParaRPr lang="en-US" dirty="0" smtClean="0">
+              <a:solidFill>
+                <a:srgbClr val="3E4346"/>
+              </a:solidFill>
+            </a:endParaRPr>
+          </a:p>
+          <a:p>
+            <a:pPr lvl="2" algn="l">
               <a:lnSpc>
                 <a:spcPct val="150000"/>
               </a:lnSpc>
             </a:pPr>
             <a:r>
-              <a:rPr lang="en-US" sz="2400" i="1" dirty="0" smtClean="0">
+              <a:rPr lang="en-US" dirty="0" smtClean="0">
                 <a:solidFill>
-                  <a:schemeClr val="tx1"/>
+                  <a:srgbClr val="3E4346"/>
                 </a:solidFill>
               </a:rPr>
-              <a:t>Removes the configuration file</a:t>
-            </a:r>
-            <a:endParaRPr lang="en-US" i="1" dirty="0" smtClean="0"/>
+              <a:t>Add an </a:t>
+            </a:r>
+            <a:r>
+              <a:rPr lang="en-US" dirty="0" err="1">
+                <a:solidFill>
+                  <a:srgbClr val="3E4346"/>
+                </a:solidFill>
+              </a:rPr>
+              <a:t>httpd_vhost</a:t>
+            </a:r>
+            <a:r>
+              <a:rPr lang="en-US" dirty="0">
+                <a:solidFill>
+                  <a:srgbClr val="3E4346"/>
+                </a:solidFill>
+              </a:rPr>
+              <a:t> resource named </a:t>
+            </a:r>
+            <a:r>
+              <a:rPr lang="en-US" dirty="0" smtClean="0">
+                <a:solidFill>
+                  <a:srgbClr val="3E4346"/>
+                </a:solidFill>
+              </a:rPr>
+              <a:t>'users' is created with the </a:t>
+            </a:r>
+            <a:r>
+              <a:rPr lang="en-US" dirty="0" err="1" smtClean="0">
+                <a:solidFill>
+                  <a:srgbClr val="3E4346"/>
+                </a:solidFill>
+              </a:rPr>
+              <a:t>site_port</a:t>
+            </a:r>
+            <a:r>
+              <a:rPr lang="en-US" dirty="0" smtClean="0">
+                <a:solidFill>
+                  <a:srgbClr val="3E4346"/>
+                </a:solidFill>
+              </a:rPr>
+              <a:t> 80</a:t>
+            </a:r>
+            <a:endParaRPr lang="en-US" dirty="0" smtClean="0"/>
           </a:p>
           <a:p>
             <a:pPr>
@@ -38825,65 +38702,30 @@
               <a:buChar char="ü"/>
             </a:pPr>
             <a:r>
+              <a:rPr lang="en-US" dirty="0" smtClean="0"/>
+              <a:t>Update </a:t>
+            </a:r>
+            <a:r>
+              <a:rPr lang="en-US" dirty="0"/>
+              <a:t>the </a:t>
+            </a:r>
+            <a:r>
               <a:rPr lang="en-US" dirty="0" err="1" smtClean="0"/>
-              <a:t>Removae</a:t>
+              <a:t>ChefSpec</a:t>
             </a:r>
             <a:r>
               <a:rPr lang="en-US" dirty="0" smtClean="0"/>
-              <a:t> </a:t>
+              <a:t> tests to stop expecting the file resource and start expecting the new resources found within the </a:t>
+            </a:r>
+            <a:r>
+              <a:rPr lang="en-US" dirty="0" err="1" smtClean="0"/>
+              <a:t>httpd_vhost</a:t>
             </a:r>
             <a:r>
               <a:rPr lang="en-US" dirty="0" smtClean="0"/>
-              <a:t>the default site by removing the 'welcome' </a:t>
-            </a:r>
-            <a:r>
-              <a:rPr lang="en-US" dirty="0" err="1" smtClean="0"/>
-              <a:t>httpd</a:t>
-            </a:r>
-            <a:r>
-              <a:rPr lang="en-US" dirty="0" smtClean="0"/>
-              <a:t> </a:t>
-            </a:r>
-            <a:r>
-              <a:rPr lang="en-US" dirty="0" err="1" smtClean="0"/>
-              <a:t>vhost</a:t>
-            </a:r>
-            <a:endParaRPr lang="en-US" dirty="0" smtClean="0"/>
-          </a:p>
-          <a:p>
-            <a:pPr marL="609559" lvl="2" algn="l">
-              <a:lnSpc>
-                <a:spcPct val="150000"/>
-              </a:lnSpc>
-              <a:spcBef>
-                <a:spcPts val="0"/>
-              </a:spcBef>
-            </a:pPr>
-            <a:r>
-              <a:rPr lang="en-US" i="1" dirty="0" smtClean="0">
-                <a:solidFill>
-                  <a:schemeClr val="tx1"/>
-                </a:solidFill>
-              </a:rPr>
-              <a:t>Ensure </a:t>
-            </a:r>
-            <a:r>
-              <a:rPr lang="en-US" i="1" dirty="0">
-                <a:solidFill>
-                  <a:schemeClr val="tx1"/>
-                </a:solidFill>
-              </a:rPr>
-              <a:t>if this resource takes action it will restart the Apache </a:t>
-            </a:r>
-            <a:r>
-              <a:rPr lang="en-US" i="1" dirty="0" smtClean="0">
-                <a:solidFill>
-                  <a:schemeClr val="tx1"/>
-                </a:solidFill>
-              </a:rPr>
-              <a:t>service</a:t>
-            </a:r>
-            <a:endParaRPr lang="en-US" i="1" dirty="0" smtClean="0"/>
+              <a:t> resource named 'users'</a:t>
+            </a:r>
+            <a:endParaRPr lang="en-US" dirty="0"/>
           </a:p>
           <a:p>
             <a:pPr>
@@ -38895,44 +38737,19 @@
             </a:pPr>
             <a:r>
               <a:rPr lang="en-US" dirty="0" smtClean="0"/>
-              <a:t>Add a 'users' </a:t>
+              <a:t>Update the </a:t>
             </a:r>
             <a:r>
               <a:rPr lang="en-US" dirty="0" err="1" smtClean="0"/>
-              <a:t>httpd</a:t>
+              <a:t>InSpec</a:t>
             </a:r>
             <a:r>
               <a:rPr lang="en-US" dirty="0" smtClean="0"/>
-              <a:t> </a:t>
-            </a:r>
-            <a:r>
-              <a:rPr lang="en-US" dirty="0" err="1" smtClean="0"/>
-              <a:t>vhost</a:t>
-            </a:r>
-            <a:r>
-              <a:rPr lang="en-US" dirty="0" smtClean="0"/>
-              <a:t> that is available on port 80</a:t>
-            </a:r>
-          </a:p>
-          <a:p>
-            <a:pPr>
-              <a:lnSpc>
-                <a:spcPct val="150000"/>
-              </a:lnSpc>
-              <a:buFont typeface="Wingdings" charset="2"/>
-              <a:buChar char="ü"/>
-            </a:pPr>
+              <a:t> tests to expect </a:t>
+            </a:r>
             <a:r>
               <a:rPr lang="en-US" dirty="0"/>
-              <a:t>Update the </a:t>
-            </a:r>
-            <a:r>
-              <a:rPr lang="en-US" dirty="0" smtClean="0"/>
-              <a:t>tests </a:t>
-            </a:r>
-            <a:r>
-              <a:rPr lang="en-US" dirty="0"/>
-              <a:t>to set expect the default site to "</a:t>
+              <a:t>the default site to "</a:t>
             </a:r>
             <a:r>
               <a:rPr lang="en-US" dirty="0" smtClean="0"/>
@@ -38945,7 +38762,7 @@
     </p:spTree>
     <p:extLst>
       <p:ext uri="{BB962C8B-B14F-4D97-AF65-F5344CB8AC3E}">
-        <p14:creationId xmlns:p14="http://schemas.microsoft.com/office/powerpoint/2010/main" val="1957429357"/>
+        <p14:creationId xmlns:p14="http://schemas.microsoft.com/office/powerpoint/2010/main" val="1747221206"/>
       </p:ext>
     </p:extLst>
   </p:cSld>
@@ -39000,20 +38817,8 @@
           <a:lstStyle/>
           <a:p>
             <a:r>
-              <a:rPr lang="en-US" dirty="0" err="1" smtClean="0"/>
-              <a:t>httpd_</a:t>
-            </a:r>
-            <a:r>
-              <a:rPr lang="en-US" dirty="0" err="1"/>
-              <a:t>v</a:t>
-            </a:r>
-            <a:r>
-              <a:rPr lang="en-US" dirty="0" err="1" smtClean="0"/>
-              <a:t>host</a:t>
-            </a:r>
-            <a:r>
               <a:rPr lang="en-US" dirty="0" smtClean="0"/>
-              <a:t> Remove Action</a:t>
+              <a:t>Discussion</a:t>
             </a:r>
             <a:endParaRPr lang="en-US" dirty="0"/>
           </a:p>
@@ -39029,215 +38834,35 @@
             <p:ph type="subTitle" idx="1"/>
           </p:nvPr>
         </p:nvSpPr>
-        <p:spPr>
-          <a:xfrm>
-            <a:off x="1671638" y="3260725"/>
-            <a:ext cx="12319000" cy="4738164"/>
-          </a:xfrm>
-        </p:spPr>
+        <p:spPr/>
         <p:txBody>
           <a:bodyPr/>
           <a:lstStyle/>
           <a:p>
-            <a:pPr>
-              <a:lnSpc>
-                <a:spcPct val="150000"/>
-              </a:lnSpc>
-              <a:buFont typeface="Wingdings" charset="2"/>
-              <a:buChar char="ü"/>
-            </a:pPr>
             <a:r>
               <a:rPr lang="en-US" dirty="0" smtClean="0"/>
-              <a:t>Update </a:t>
+              <a:t>What are the benefits of using a custom resource to manage the virtual hosts?</a:t>
             </a:r>
             <a:r>
               <a:rPr lang="en-US" dirty="0"/>
-              <a:t>the default recipe's </a:t>
+              <a:t> </a:t>
             </a:r>
             <a:r>
               <a:rPr lang="en-US" dirty="0" smtClean="0"/>
-              <a:t>policy:</a:t>
-            </a:r>
+              <a:t>What are the drawbacks of using a custom resource?</a:t>
+            </a:r>
+          </a:p>
+          <a:p>
             <a:endParaRPr lang="en-US" dirty="0"/>
           </a:p>
           <a:p>
-            <a:pPr lvl="2" algn="l">
-              <a:lnSpc>
-                <a:spcPct val="150000"/>
-              </a:lnSpc>
-            </a:pPr>
-            <a:r>
-              <a:rPr lang="en-US" dirty="0" smtClean="0">
-                <a:solidFill>
-                  <a:srgbClr val="3E4346"/>
-                </a:solidFill>
-              </a:rPr>
-              <a:t>Remove the file resource named </a:t>
-            </a:r>
-            <a:r>
-              <a:rPr lang="en-US" dirty="0">
-                <a:solidFill>
-                  <a:srgbClr val="3E4346"/>
-                </a:solidFill>
-              </a:rPr>
-              <a:t>'/</a:t>
-            </a:r>
-            <a:r>
-              <a:rPr lang="en-US" dirty="0" err="1">
-                <a:solidFill>
-                  <a:srgbClr val="3E4346"/>
-                </a:solidFill>
-              </a:rPr>
-              <a:t>var</a:t>
-            </a:r>
-            <a:r>
-              <a:rPr lang="en-US" dirty="0">
-                <a:solidFill>
-                  <a:srgbClr val="3E4346"/>
-                </a:solidFill>
-              </a:rPr>
-              <a:t>/www/html/</a:t>
-            </a:r>
-            <a:r>
-              <a:rPr lang="en-US" dirty="0" err="1">
-                <a:solidFill>
-                  <a:srgbClr val="3E4346"/>
-                </a:solidFill>
-              </a:rPr>
-              <a:t>index.html</a:t>
-            </a:r>
-            <a:r>
-              <a:rPr lang="en-US" dirty="0">
-                <a:solidFill>
-                  <a:srgbClr val="3E4346"/>
-                </a:solidFill>
-              </a:rPr>
-              <a:t>'</a:t>
-            </a:r>
-            <a:endParaRPr lang="en-US" dirty="0" smtClean="0">
-              <a:solidFill>
-                <a:srgbClr val="3E4346"/>
-              </a:solidFill>
-            </a:endParaRPr>
-          </a:p>
-          <a:p>
-            <a:pPr lvl="2" algn="l">
-              <a:lnSpc>
-                <a:spcPct val="150000"/>
-              </a:lnSpc>
-            </a:pPr>
-            <a:r>
-              <a:rPr lang="en-US" dirty="0" smtClean="0">
-                <a:solidFill>
-                  <a:srgbClr val="3E4346"/>
-                </a:solidFill>
-              </a:rPr>
-              <a:t>Add an </a:t>
-            </a:r>
-            <a:r>
-              <a:rPr lang="en-US" dirty="0" err="1">
-                <a:solidFill>
-                  <a:srgbClr val="3E4346"/>
-                </a:solidFill>
-              </a:rPr>
-              <a:t>httpd_vhost</a:t>
-            </a:r>
-            <a:r>
-              <a:rPr lang="en-US" dirty="0">
-                <a:solidFill>
-                  <a:srgbClr val="3E4346"/>
-                </a:solidFill>
-              </a:rPr>
-              <a:t> resource named </a:t>
-            </a:r>
-            <a:r>
-              <a:rPr lang="en-US" dirty="0" smtClean="0">
-                <a:solidFill>
-                  <a:srgbClr val="3E4346"/>
-                </a:solidFill>
-              </a:rPr>
-              <a:t>'users' is created with the </a:t>
-            </a:r>
-            <a:r>
-              <a:rPr lang="en-US" dirty="0" err="1" smtClean="0">
-                <a:solidFill>
-                  <a:srgbClr val="3E4346"/>
-                </a:solidFill>
-              </a:rPr>
-              <a:t>site_port</a:t>
-            </a:r>
-            <a:r>
-              <a:rPr lang="en-US" dirty="0" smtClean="0">
-                <a:solidFill>
-                  <a:srgbClr val="3E4346"/>
-                </a:solidFill>
-              </a:rPr>
-              <a:t> 80</a:t>
-            </a:r>
-            <a:endParaRPr lang="en-US" dirty="0" smtClean="0"/>
-          </a:p>
-          <a:p>
-            <a:pPr>
-              <a:lnSpc>
-                <a:spcPct val="150000"/>
-              </a:lnSpc>
-              <a:buFont typeface="Wingdings" charset="2"/>
-              <a:buChar char="ü"/>
-            </a:pPr>
             <a:r>
               <a:rPr lang="en-US" dirty="0" smtClean="0"/>
-              <a:t>Update </a:t>
-            </a:r>
-            <a:r>
-              <a:rPr lang="en-US" dirty="0"/>
-              <a:t>the </a:t>
-            </a:r>
-            <a:r>
-              <a:rPr lang="en-US" dirty="0" err="1" smtClean="0"/>
-              <a:t>ChefSpec</a:t>
-            </a:r>
-            <a:r>
-              <a:rPr lang="en-US" dirty="0" smtClean="0"/>
-              <a:t> tests to stop expecting the file resource and start expecting the new resources found within the </a:t>
-            </a:r>
-            <a:r>
-              <a:rPr lang="en-US" dirty="0" err="1" smtClean="0"/>
-              <a:t>httpd_vhost</a:t>
-            </a:r>
-            <a:r>
-              <a:rPr lang="en-US" dirty="0" smtClean="0"/>
-              <a:t> resource named 'users'</a:t>
+              <a:t>What does the resource collection look like when using a custom resource?</a:t>
             </a:r>
             <a:endParaRPr lang="en-US" dirty="0"/>
           </a:p>
           <a:p>
-            <a:pPr>
-              <a:lnSpc>
-                <a:spcPct val="150000"/>
-              </a:lnSpc>
-              <a:buFont typeface="Wingdings" charset="2"/>
-              <a:buChar char="ü"/>
-            </a:pPr>
-            <a:r>
-              <a:rPr lang="en-US" dirty="0" smtClean="0"/>
-              <a:t>Update the </a:t>
-            </a:r>
-            <a:r>
-              <a:rPr lang="en-US" dirty="0" err="1" smtClean="0"/>
-              <a:t>InSpec</a:t>
-            </a:r>
-            <a:r>
-              <a:rPr lang="en-US" dirty="0" smtClean="0"/>
-              <a:t> tests to expect </a:t>
-            </a:r>
-            <a:r>
-              <a:rPr lang="en-US" dirty="0"/>
-              <a:t>the default site to "</a:t>
-            </a:r>
-            <a:r>
-              <a:rPr lang="en-US" dirty="0" smtClean="0"/>
-              <a:t>Welcome users!"</a:t>
-            </a:r>
             <a:endParaRPr lang="en-US" dirty="0"/>
           </a:p>
         </p:txBody>
@@ -39245,7 +38870,7 @@
     </p:spTree>
     <p:extLst>
       <p:ext uri="{BB962C8B-B14F-4D97-AF65-F5344CB8AC3E}">
-        <p14:creationId xmlns:p14="http://schemas.microsoft.com/office/powerpoint/2010/main" val="1747221206"/>
+        <p14:creationId xmlns:p14="http://schemas.microsoft.com/office/powerpoint/2010/main" val="504990886"/>
       </p:ext>
     </p:extLst>
   </p:cSld>
@@ -39301,114 +38926,6 @@
           <a:p>
             <a:r>
               <a:rPr lang="en-US" dirty="0" smtClean="0"/>
-              <a:t>Discussion</a:t>
-            </a:r>
-            <a:endParaRPr lang="en-US" dirty="0"/>
-          </a:p>
-        </p:txBody>
-      </p:sp>
-      <p:sp>
-        <p:nvSpPr>
-          <p:cNvPr id="3" name="Subtitle 2"/>
-          <p:cNvSpPr>
-            <a:spLocks noGrp="1"/>
-          </p:cNvSpPr>
-          <p:nvPr>
-            <p:ph type="subTitle" idx="1"/>
-          </p:nvPr>
-        </p:nvSpPr>
-        <p:spPr/>
-        <p:txBody>
-          <a:bodyPr/>
-          <a:lstStyle/>
-          <a:p>
-            <a:r>
-              <a:rPr lang="en-US" dirty="0" smtClean="0"/>
-              <a:t>What are the benefits of using a custom resource to manage the virtual hosts?</a:t>
-            </a:r>
-            <a:r>
-              <a:rPr lang="en-US" dirty="0"/>
-              <a:t> </a:t>
-            </a:r>
-            <a:r>
-              <a:rPr lang="en-US" dirty="0" smtClean="0"/>
-              <a:t>What are the drawbacks of using a custom resource?</a:t>
-            </a:r>
-          </a:p>
-          <a:p>
-            <a:endParaRPr lang="en-US" dirty="0"/>
-          </a:p>
-          <a:p>
-            <a:r>
-              <a:rPr lang="en-US" dirty="0" smtClean="0"/>
-              <a:t>What does the resource collection look like when using a custom resource?</a:t>
-            </a:r>
-            <a:endParaRPr lang="en-US" dirty="0"/>
-          </a:p>
-          <a:p>
-            <a:endParaRPr lang="en-US" dirty="0"/>
-          </a:p>
-        </p:txBody>
-      </p:sp>
-    </p:spTree>
-    <p:extLst>
-      <p:ext uri="{BB962C8B-B14F-4D97-AF65-F5344CB8AC3E}">
-        <p14:creationId xmlns:p14="http://schemas.microsoft.com/office/powerpoint/2010/main" val="504990886"/>
-      </p:ext>
-    </p:extLst>
-  </p:cSld>
-  <p:clrMapOvr>
-    <a:masterClrMapping/>
-  </p:clrMapOvr>
-  <p:transition spd="med">
-    <p:fade/>
-  </p:transition>
-  <p:timing>
-    <p:tnLst>
-      <p:par>
-        <p:cTn id="1" dur="indefinite" restart="never" nodeType="tmRoot"/>
-      </p:par>
-    </p:tnLst>
-  </p:timing>
-</p:sld>
-</file>
-
-<file path=ppt/slides/slide65.xml><?xml version="1.0" encoding="utf-8"?>
-<p:sld xmlns:a="http://schemas.openxmlformats.org/drawingml/2006/main" xmlns:r="http://schemas.openxmlformats.org/officeDocument/2006/relationships" xmlns:p="http://schemas.openxmlformats.org/presentationml/2006/main">
-  <p:cSld>
-    <p:spTree>
-      <p:nvGrpSpPr>
-        <p:cNvPr id="1" name=""/>
-        <p:cNvGrpSpPr/>
-        <p:nvPr/>
-      </p:nvGrpSpPr>
-      <p:grpSpPr>
-        <a:xfrm>
-          <a:off x="0" y="0"/>
-          <a:ext cx="0" cy="0"/>
-          <a:chOff x="0" y="0"/>
-          <a:chExt cx="0" cy="0"/>
-        </a:xfrm>
-      </p:grpSpPr>
-      <p:sp>
-        <p:nvSpPr>
-          <p:cNvPr id="2" name="Title 1"/>
-          <p:cNvSpPr>
-            <a:spLocks noGrp="1"/>
-          </p:cNvSpPr>
-          <p:nvPr>
-            <p:ph type="ctrTitle"/>
-          </p:nvPr>
-        </p:nvSpPr>
-        <p:spPr/>
-        <p:txBody>
-          <a:bodyPr>
-            <a:normAutofit fontScale="90000"/>
-          </a:bodyPr>
-          <a:lstStyle/>
-          <a:p>
-            <a:r>
-              <a:rPr lang="en-US" dirty="0" smtClean="0"/>
               <a:t>Q&amp;A</a:t>
             </a:r>
             <a:endParaRPr lang="en-US" dirty="0"/>
@@ -39461,7 +38978,7 @@
 </p:sld>
 </file>
 
-<file path=ppt/slides/slide66.xml><?xml version="1.0" encoding="utf-8"?>
+<file path=ppt/slides/slide65.xml><?xml version="1.0" encoding="utf-8"?>
 <p:sld xmlns:a="http://schemas.openxmlformats.org/drawingml/2006/main" xmlns:r="http://schemas.openxmlformats.org/officeDocument/2006/relationships" xmlns:p="http://schemas.openxmlformats.org/presentationml/2006/main">
   <p:cSld>
     <p:spTree>

</xml_diff>